<commit_message>
FEature detector trials and minor changes. PPTX update.
</commit_message>
<xml_diff>
--- a/notebooks/poc/Regression_impactdamanges_shearography.pptx
+++ b/notebooks/poc/Regression_impactdamanges_shearography.pptx
@@ -112,6 +112,11 @@
       </a:defRPr>
     </a:lvl9pPr>
   </p:defaultTextStyle>
+  <p:extLst>
+    <p:ext uri="{EFAFB233-063F-42B5-8137-9DF3F51BA10A}">
+      <p15:sldGuideLst xmlns:p15="http://schemas.microsoft.com/office/powerpoint/2012/main"/>
+    </p:ext>
+  </p:extLst>
 </p:presentation>
 </file>
 
@@ -197,7 +202,7 @@
           <a:p>
             <a:fld id="{7D946D0E-6D22-4035-93F3-99261F2DA010}" type="datetimeFigureOut">
               <a:rPr lang="en-US" smtClean="0"/>
-              <a:t>11/1/2019</a:t>
+              <a:t>11/2/2019</a:t>
             </a:fld>
             <a:endParaRPr lang="en-US"/>
           </a:p>
@@ -698,7 +703,7 @@
           <a:p>
             <a:fld id="{1AA97550-AA23-4C52-A603-670A12C9619F}" type="datetimeFigureOut">
               <a:rPr lang="en-US" smtClean="0"/>
-              <a:t>11/1/2019</a:t>
+              <a:t>11/2/2019</a:t>
             </a:fld>
             <a:endParaRPr lang="en-US"/>
           </a:p>
@@ -898,7 +903,7 @@
           <a:p>
             <a:fld id="{1AA97550-AA23-4C52-A603-670A12C9619F}" type="datetimeFigureOut">
               <a:rPr lang="en-US" smtClean="0"/>
-              <a:t>11/1/2019</a:t>
+              <a:t>11/2/2019</a:t>
             </a:fld>
             <a:endParaRPr lang="en-US"/>
           </a:p>
@@ -1108,7 +1113,7 @@
           <a:p>
             <a:fld id="{1AA97550-AA23-4C52-A603-670A12C9619F}" type="datetimeFigureOut">
               <a:rPr lang="en-US" smtClean="0"/>
-              <a:t>11/1/2019</a:t>
+              <a:t>11/2/2019</a:t>
             </a:fld>
             <a:endParaRPr lang="en-US"/>
           </a:p>
@@ -1308,7 +1313,7 @@
           <a:p>
             <a:fld id="{1AA97550-AA23-4C52-A603-670A12C9619F}" type="datetimeFigureOut">
               <a:rPr lang="en-US" smtClean="0"/>
-              <a:t>11/1/2019</a:t>
+              <a:t>11/2/2019</a:t>
             </a:fld>
             <a:endParaRPr lang="en-US"/>
           </a:p>
@@ -1584,7 +1589,7 @@
           <a:p>
             <a:fld id="{1AA97550-AA23-4C52-A603-670A12C9619F}" type="datetimeFigureOut">
               <a:rPr lang="en-US" smtClean="0"/>
-              <a:t>11/1/2019</a:t>
+              <a:t>11/2/2019</a:t>
             </a:fld>
             <a:endParaRPr lang="en-US"/>
           </a:p>
@@ -1852,7 +1857,7 @@
           <a:p>
             <a:fld id="{1AA97550-AA23-4C52-A603-670A12C9619F}" type="datetimeFigureOut">
               <a:rPr lang="en-US" smtClean="0"/>
-              <a:t>11/1/2019</a:t>
+              <a:t>11/2/2019</a:t>
             </a:fld>
             <a:endParaRPr lang="en-US"/>
           </a:p>
@@ -2267,7 +2272,7 @@
           <a:p>
             <a:fld id="{1AA97550-AA23-4C52-A603-670A12C9619F}" type="datetimeFigureOut">
               <a:rPr lang="en-US" smtClean="0"/>
-              <a:t>11/1/2019</a:t>
+              <a:t>11/2/2019</a:t>
             </a:fld>
             <a:endParaRPr lang="en-US"/>
           </a:p>
@@ -2409,7 +2414,7 @@
           <a:p>
             <a:fld id="{1AA97550-AA23-4C52-A603-670A12C9619F}" type="datetimeFigureOut">
               <a:rPr lang="en-US" smtClean="0"/>
-              <a:t>11/1/2019</a:t>
+              <a:t>11/2/2019</a:t>
             </a:fld>
             <a:endParaRPr lang="en-US"/>
           </a:p>
@@ -2522,7 +2527,7 @@
           <a:p>
             <a:fld id="{1AA97550-AA23-4C52-A603-670A12C9619F}" type="datetimeFigureOut">
               <a:rPr lang="en-US" smtClean="0"/>
-              <a:t>11/1/2019</a:t>
+              <a:t>11/2/2019</a:t>
             </a:fld>
             <a:endParaRPr lang="en-US"/>
           </a:p>
@@ -2835,7 +2840,7 @@
           <a:p>
             <a:fld id="{1AA97550-AA23-4C52-A603-670A12C9619F}" type="datetimeFigureOut">
               <a:rPr lang="en-US" smtClean="0"/>
-              <a:t>11/1/2019</a:t>
+              <a:t>11/2/2019</a:t>
             </a:fld>
             <a:endParaRPr lang="en-US"/>
           </a:p>
@@ -3124,7 +3129,7 @@
           <a:p>
             <a:fld id="{1AA97550-AA23-4C52-A603-670A12C9619F}" type="datetimeFigureOut">
               <a:rPr lang="en-US" smtClean="0"/>
-              <a:t>11/1/2019</a:t>
+              <a:t>11/2/2019</a:t>
             </a:fld>
             <a:endParaRPr lang="en-US"/>
           </a:p>
@@ -3367,7 +3372,7 @@
           <a:p>
             <a:fld id="{1AA97550-AA23-4C52-A603-670A12C9619F}" type="datetimeFigureOut">
               <a:rPr lang="en-US" smtClean="0"/>
-              <a:t>11/1/2019</a:t>
+              <a:t>11/2/2019</a:t>
             </a:fld>
             <a:endParaRPr lang="en-US"/>
           </a:p>
@@ -4386,20 +4391,115 @@
         </p:blipFill>
         <p:spPr>
           <a:xfrm>
-            <a:off x="356843" y="4536192"/>
-            <a:ext cx="2492890" cy="1899987"/>
+            <a:off x="356843" y="4989250"/>
+            <a:ext cx="1898452" cy="1446929"/>
           </a:xfrm>
           <a:prstGeom prst="rect">
             <a:avLst/>
           </a:prstGeom>
         </p:spPr>
       </p:pic>
-      <p:sp>
-        <p:nvSpPr>
-          <p:cNvPr id="10" name="CaixaDeTexto 9">
-            <a:extLst>
-              <a:ext uri="{FF2B5EF4-FFF2-40B4-BE49-F238E27FC236}">
-                <a16:creationId xmlns:a16="http://schemas.microsoft.com/office/drawing/2014/main" id="{20EFC11C-628E-4DB0-BE89-4687B5B394F7}"/>
+      <p:pic>
+        <p:nvPicPr>
+          <p:cNvPr id="4" name="Imagem 3">
+            <a:extLst>
+              <a:ext uri="{FF2B5EF4-FFF2-40B4-BE49-F238E27FC236}">
+                <a16:creationId xmlns:a16="http://schemas.microsoft.com/office/drawing/2014/main" id="{1683195A-89A1-4825-BCFD-DC55F0DEFC5B}"/>
+              </a:ext>
+            </a:extLst>
+          </p:cNvPr>
+          <p:cNvPicPr>
+            <a:picLocks noChangeAspect="1"/>
+          </p:cNvPicPr>
+          <p:nvPr/>
+        </p:nvPicPr>
+        <p:blipFill>
+          <a:blip r:embed="rId3"/>
+          <a:stretch>
+            <a:fillRect/>
+          </a:stretch>
+        </p:blipFill>
+        <p:spPr>
+          <a:xfrm>
+            <a:off x="6285390" y="104055"/>
+            <a:ext cx="5347281" cy="2288503"/>
+          </a:xfrm>
+          <a:prstGeom prst="rect">
+            <a:avLst/>
+          </a:prstGeom>
+        </p:spPr>
+      </p:pic>
+      <p:pic>
+        <p:nvPicPr>
+          <p:cNvPr id="6" name="Imagem 5">
+            <a:extLst>
+              <a:ext uri="{FF2B5EF4-FFF2-40B4-BE49-F238E27FC236}">
+                <a16:creationId xmlns:a16="http://schemas.microsoft.com/office/drawing/2014/main" id="{BF5E2503-3175-46DC-B5A2-2F195C190EA3}"/>
+              </a:ext>
+            </a:extLst>
+          </p:cNvPr>
+          <p:cNvPicPr>
+            <a:picLocks noChangeAspect="1"/>
+          </p:cNvPicPr>
+          <p:nvPr/>
+        </p:nvPicPr>
+        <p:blipFill>
+          <a:blip r:embed="rId4"/>
+          <a:stretch>
+            <a:fillRect/>
+          </a:stretch>
+        </p:blipFill>
+        <p:spPr>
+          <a:xfrm>
+            <a:off x="7151288" y="3500661"/>
+            <a:ext cx="4754029" cy="2071062"/>
+          </a:xfrm>
+          <a:prstGeom prst="rect">
+            <a:avLst/>
+          </a:prstGeom>
+        </p:spPr>
+      </p:pic>
+      <p:pic>
+        <p:nvPicPr>
+          <p:cNvPr id="9" name="Imagem 8">
+            <a:extLst>
+              <a:ext uri="{FF2B5EF4-FFF2-40B4-BE49-F238E27FC236}">
+                <a16:creationId xmlns:a16="http://schemas.microsoft.com/office/drawing/2014/main" id="{99AB39A6-4C48-47A9-A403-7E85A6C4E601}"/>
+              </a:ext>
+            </a:extLst>
+          </p:cNvPr>
+          <p:cNvPicPr>
+            <a:picLocks noChangeAspect="1"/>
+          </p:cNvPicPr>
+          <p:nvPr/>
+        </p:nvPicPr>
+        <p:blipFill>
+          <a:blip r:embed="rId5"/>
+          <a:stretch>
+            <a:fillRect/>
+          </a:stretch>
+        </p:blipFill>
+        <p:spPr>
+          <a:xfrm>
+            <a:off x="7432025" y="4056189"/>
+            <a:ext cx="4058640" cy="2113209"/>
+          </a:xfrm>
+          <a:prstGeom prst="rect">
+            <a:avLst/>
+          </a:prstGeom>
+          <a:ln>
+            <a:solidFill>
+              <a:schemeClr val="bg2"/>
+            </a:solidFill>
+          </a:ln>
+        </p:spPr>
+      </p:pic>
+      <p:sp>
+        <p:nvSpPr>
+          <p:cNvPr id="11" name="CaixaDeTexto 10">
+            <a:extLst>
+              <a:ext uri="{FF2B5EF4-FFF2-40B4-BE49-F238E27FC236}">
+                <a16:creationId xmlns:a16="http://schemas.microsoft.com/office/drawing/2014/main" id="{A5B01F18-7C5F-4013-955C-E9A4929BCC19}"/>
               </a:ext>
             </a:extLst>
           </p:cNvPr>
@@ -4408,8 +4508,8 @@
         </p:nvSpPr>
         <p:spPr>
           <a:xfrm>
-            <a:off x="532660" y="3718786"/>
-            <a:ext cx="2929632" cy="646331"/>
+            <a:off x="2660343" y="4056189"/>
+            <a:ext cx="3435657" cy="2246769"/>
           </a:xfrm>
           <a:prstGeom prst="rect">
             <a:avLst/>
@@ -4422,62 +4522,133 @@
           </a:bodyPr>
           <a:lstStyle/>
           <a:p>
-            <a:r>
-              <a:rPr lang="pt-BR" dirty="0"/>
-              <a:t>* </a:t>
-            </a:r>
-            <a:r>
-              <a:rPr lang="pt-BR" dirty="0" err="1"/>
-              <a:t>Image</a:t>
-            </a:r>
-            <a:r>
-              <a:rPr lang="pt-BR" dirty="0"/>
-              <a:t> </a:t>
-            </a:r>
-            <a:r>
-              <a:rPr lang="pt-BR" dirty="0" err="1"/>
-              <a:t>size</a:t>
-            </a:r>
-            <a:r>
-              <a:rPr lang="pt-BR" dirty="0"/>
-              <a:t> </a:t>
-            </a:r>
-            <a:r>
-              <a:rPr lang="pt-BR" dirty="0" err="1"/>
-              <a:t>reduction</a:t>
-            </a:r>
-            <a:r>
-              <a:rPr lang="pt-BR" dirty="0"/>
-              <a:t> leads </a:t>
-            </a:r>
-            <a:r>
-              <a:rPr lang="pt-BR" dirty="0" err="1"/>
-              <a:t>to</a:t>
-            </a:r>
-            <a:r>
-              <a:rPr lang="pt-BR" dirty="0"/>
-              <a:t> </a:t>
-            </a:r>
-            <a:r>
-              <a:rPr lang="pt-BR" dirty="0" err="1"/>
-              <a:t>worse</a:t>
-            </a:r>
-            <a:r>
-              <a:rPr lang="pt-BR" dirty="0"/>
-              <a:t> </a:t>
-            </a:r>
-            <a:r>
-              <a:rPr lang="pt-BR" dirty="0" err="1"/>
-              <a:t>results</a:t>
-            </a:r>
-            <a:r>
-              <a:rPr lang="pt-BR" dirty="0"/>
-              <a:t>.</a:t>
-            </a:r>
-            <a:endParaRPr lang="en-US" dirty="0"/>
-          </a:p>
-        </p:txBody>
-      </p:sp>
+            <a:pPr marL="285750" indent="-285750">
+              <a:buFont typeface="Arial" panose="020B0604020202020204" pitchFamily="34" charset="0"/>
+              <a:buChar char="•"/>
+            </a:pPr>
+            <a:r>
+              <a:rPr lang="pt-BR" sz="1400" dirty="0"/>
+              <a:t>Aumentar o numero de </a:t>
+            </a:r>
+            <a:r>
+              <a:rPr lang="pt-BR" sz="1400" dirty="0" err="1"/>
+              <a:t>estimator</a:t>
+            </a:r>
+            <a:r>
+              <a:rPr lang="pt-BR" sz="1400" dirty="0"/>
+              <a:t> faz com que o erro de validação caia mas com que o de teste se mantenha. Ideal para escolha do melhor modelo.</a:t>
+            </a:r>
+          </a:p>
+          <a:p>
+            <a:pPr marL="285750" indent="-285750">
+              <a:buFont typeface="Arial" panose="020B0604020202020204" pitchFamily="34" charset="0"/>
+              <a:buChar char="•"/>
+            </a:pPr>
+            <a:r>
+              <a:rPr lang="pt-BR" sz="1400" dirty="0"/>
+              <a:t>PCA é bem melhor e mais rápido.</a:t>
+            </a:r>
+          </a:p>
+          <a:p>
+            <a:pPr marL="285750" indent="-285750">
+              <a:buFont typeface="Arial" panose="020B0604020202020204" pitchFamily="34" charset="0"/>
+              <a:buChar char="•"/>
+            </a:pPr>
+            <a:r>
+              <a:rPr lang="pt-BR" sz="1400" dirty="0"/>
+              <a:t>Sem estar </a:t>
+            </a:r>
+            <a:r>
+              <a:rPr lang="pt-BR" sz="1400" dirty="0" err="1"/>
+              <a:t>smooth</a:t>
+            </a:r>
+            <a:r>
+              <a:rPr lang="pt-BR" sz="1400" dirty="0"/>
+              <a:t> eh melhor</a:t>
+            </a:r>
+          </a:p>
+          <a:p>
+            <a:pPr marL="285750" indent="-285750">
+              <a:buFont typeface="Arial" panose="020B0604020202020204" pitchFamily="34" charset="0"/>
+              <a:buChar char="•"/>
+            </a:pPr>
+            <a:r>
+              <a:rPr lang="pt-BR" sz="1400" dirty="0"/>
+              <a:t>Diminuir o tamanho da imagem melhora o resultado no teste, mas não na validação.</a:t>
+            </a:r>
+          </a:p>
+          <a:p>
+            <a:endParaRPr lang="en-US" sz="1400" dirty="0"/>
+          </a:p>
+        </p:txBody>
+      </p:sp>
+      <p:pic>
+        <p:nvPicPr>
+          <p:cNvPr id="12" name="Imagem 11">
+            <a:extLst>
+              <a:ext uri="{FF2B5EF4-FFF2-40B4-BE49-F238E27FC236}">
+                <a16:creationId xmlns:a16="http://schemas.microsoft.com/office/drawing/2014/main" id="{FFB05DD2-EDA6-4144-AC27-0BB0C9E77EE7}"/>
+              </a:ext>
+            </a:extLst>
+          </p:cNvPr>
+          <p:cNvPicPr>
+            <a:picLocks noChangeAspect="1"/>
+          </p:cNvPicPr>
+          <p:nvPr/>
+        </p:nvPicPr>
+        <p:blipFill>
+          <a:blip r:embed="rId6"/>
+          <a:stretch>
+            <a:fillRect/>
+          </a:stretch>
+        </p:blipFill>
+        <p:spPr>
+          <a:xfrm>
+            <a:off x="5474195" y="461796"/>
+            <a:ext cx="4611210" cy="2493164"/>
+          </a:xfrm>
+          <a:prstGeom prst="rect">
+            <a:avLst/>
+          </a:prstGeom>
+          <a:ln>
+            <a:solidFill>
+              <a:schemeClr val="bg1">
+                <a:lumMod val="75000"/>
+              </a:schemeClr>
+            </a:solidFill>
+          </a:ln>
+        </p:spPr>
+      </p:pic>
+      <p:pic>
+        <p:nvPicPr>
+          <p:cNvPr id="13" name="Imagem 12">
+            <a:extLst>
+              <a:ext uri="{FF2B5EF4-FFF2-40B4-BE49-F238E27FC236}">
+                <a16:creationId xmlns:a16="http://schemas.microsoft.com/office/drawing/2014/main" id="{A5A550D2-1BFD-4E70-BED8-B73845A719E5}"/>
+              </a:ext>
+            </a:extLst>
+          </p:cNvPr>
+          <p:cNvPicPr>
+            <a:picLocks noChangeAspect="1"/>
+          </p:cNvPicPr>
+          <p:nvPr/>
+        </p:nvPicPr>
+        <p:blipFill>
+          <a:blip r:embed="rId7"/>
+          <a:stretch>
+            <a:fillRect/>
+          </a:stretch>
+        </p:blipFill>
+        <p:spPr>
+          <a:xfrm>
+            <a:off x="6907195" y="875710"/>
+            <a:ext cx="3989405" cy="2244040"/>
+          </a:xfrm>
+          <a:prstGeom prst="rect">
+            <a:avLst/>
+          </a:prstGeom>
+        </p:spPr>
+      </p:pic>
     </p:spTree>
     <p:extLst>
       <p:ext uri="{BB962C8B-B14F-4D97-AF65-F5344CB8AC3E}">
@@ -4602,14 +4773,14 @@
           <p:nvPr>
             <p:extLst>
               <p:ext uri="{D42A27DB-BD31-4B8C-83A1-F6EECF244321}">
-                <p14:modId xmlns:p14="http://schemas.microsoft.com/office/powerpoint/2010/main" val="1373679915"/>
+                <p14:modId xmlns:p14="http://schemas.microsoft.com/office/powerpoint/2010/main" val="2225177891"/>
               </p:ext>
             </p:extLst>
           </p:nvPr>
         </p:nvGraphicFramePr>
         <p:xfrm>
-          <a:off x="133166" y="1325563"/>
-          <a:ext cx="5772220" cy="2755400"/>
+          <a:off x="133166" y="1325562"/>
+          <a:ext cx="4616388" cy="2401984"/>
         </p:xfrm>
         <a:graphic>
           <a:graphicData uri="http://schemas.openxmlformats.org/drawingml/2006/table">
@@ -4618,35 +4789,35 @@
                 <a:tableStyleId>{5C22544A-7EE6-4342-B048-85BDC9FD1C3A}</a:tableStyleId>
               </a:tblPr>
               <a:tblGrid>
-                <a:gridCol w="1567737">
+                <a:gridCol w="1253812">
                   <a:extLst>
                     <a:ext uri="{9D8B030D-6E8A-4147-A177-3AD203B41FA5}">
                       <a16:colId xmlns:a16="http://schemas.microsoft.com/office/drawing/2014/main" val="2282629247"/>
                     </a:ext>
                   </a:extLst>
                 </a:gridCol>
-                <a:gridCol w="1022761">
+                <a:gridCol w="817963">
                   <a:extLst>
                     <a:ext uri="{9D8B030D-6E8A-4147-A177-3AD203B41FA5}">
                       <a16:colId xmlns:a16="http://schemas.microsoft.com/office/drawing/2014/main" val="1068046132"/>
                     </a:ext>
                   </a:extLst>
                 </a:gridCol>
-                <a:gridCol w="1022761">
+                <a:gridCol w="817963">
                   <a:extLst>
                     <a:ext uri="{9D8B030D-6E8A-4147-A177-3AD203B41FA5}">
                       <a16:colId xmlns:a16="http://schemas.microsoft.com/office/drawing/2014/main" val="549965931"/>
                     </a:ext>
                   </a:extLst>
                 </a:gridCol>
-                <a:gridCol w="1142207">
+                <a:gridCol w="913491">
                   <a:extLst>
                     <a:ext uri="{9D8B030D-6E8A-4147-A177-3AD203B41FA5}">
                       <a16:colId xmlns:a16="http://schemas.microsoft.com/office/drawing/2014/main" val="898612138"/>
                     </a:ext>
                   </a:extLst>
                 </a:gridCol>
-                <a:gridCol w="1016754">
+                <a:gridCol w="813159">
                   <a:extLst>
                     <a:ext uri="{9D8B030D-6E8A-4147-A177-3AD203B41FA5}">
                       <a16:colId xmlns:a16="http://schemas.microsoft.com/office/drawing/2014/main" val="3804117115"/>
@@ -4654,17 +4825,17 @@
                   </a:extLst>
                 </a:gridCol>
               </a:tblGrid>
-              <a:tr h="0">
+              <a:tr h="707293">
                 <a:tc>
                   <a:txBody>
                     <a:bodyPr/>
                     <a:lstStyle/>
                     <a:p>
                       <a:r>
-                        <a:rPr lang="pt-BR" sz="1400" dirty="0"/>
+                        <a:rPr lang="pt-BR" sz="1000" dirty="0"/>
                         <a:t>IM_SIZE, CELLS_PER_BLOCK, PIXELS_PER_CELL, ORIENTATIONS</a:t>
                       </a:r>
-                      <a:endParaRPr lang="en-US" sz="1400" dirty="0"/>
+                      <a:endParaRPr lang="en-US" sz="1000" dirty="0"/>
                     </a:p>
                   </a:txBody>
                   <a:tcPr/>
@@ -4675,30 +4846,30 @@
                     <a:lstStyle/>
                     <a:p>
                       <a:r>
-                        <a:rPr lang="pt-BR" sz="1400" dirty="0"/>
+                        <a:rPr lang="pt-BR" sz="1000" dirty="0"/>
                         <a:t>Total </a:t>
                       </a:r>
                       <a:r>
-                        <a:rPr lang="pt-BR" sz="1400" dirty="0" err="1"/>
+                        <a:rPr lang="pt-BR" sz="1000" dirty="0" err="1"/>
                         <a:t>number</a:t>
                       </a:r>
                       <a:r>
-                        <a:rPr lang="pt-BR" sz="1400" dirty="0"/>
+                        <a:rPr lang="pt-BR" sz="1000" dirty="0"/>
                         <a:t> </a:t>
                       </a:r>
                       <a:r>
-                        <a:rPr lang="pt-BR" sz="1400" dirty="0" err="1"/>
+                        <a:rPr lang="pt-BR" sz="1000" dirty="0" err="1"/>
                         <a:t>of</a:t>
                       </a:r>
                       <a:r>
-                        <a:rPr lang="pt-BR" sz="1400" dirty="0"/>
+                        <a:rPr lang="pt-BR" sz="1000" dirty="0"/>
                         <a:t> HOG </a:t>
                       </a:r>
                       <a:r>
-                        <a:rPr lang="pt-BR" sz="1400" dirty="0" err="1"/>
+                        <a:rPr lang="pt-BR" sz="1000" dirty="0" err="1"/>
                         <a:t>parameters</a:t>
                       </a:r>
-                      <a:endParaRPr lang="en-US" sz="1400" dirty="0"/>
+                      <a:endParaRPr lang="en-US" sz="1000" dirty="0"/>
                     </a:p>
                   </a:txBody>
                   <a:tcPr/>
@@ -4709,38 +4880,38 @@
                     <a:lstStyle/>
                     <a:p>
                       <a:r>
-                        <a:rPr lang="pt-BR" sz="1400" dirty="0"/>
+                        <a:rPr lang="pt-BR" sz="1000" dirty="0"/>
                         <a:t>RF </a:t>
                       </a:r>
                       <a:r>
-                        <a:rPr lang="pt-BR" sz="1400" dirty="0" err="1"/>
+                        <a:rPr lang="pt-BR" sz="1000" dirty="0" err="1"/>
                         <a:t>parameters</a:t>
                       </a:r>
                       <a:r>
-                        <a:rPr lang="pt-BR" sz="1400" dirty="0"/>
+                        <a:rPr lang="pt-BR" sz="1000" dirty="0"/>
                         <a:t>: </a:t>
                       </a:r>
                       <a:r>
-                        <a:rPr lang="pt-BR" sz="1400" dirty="0" err="1"/>
+                        <a:rPr lang="pt-BR" sz="1000" dirty="0" err="1"/>
                         <a:t>estimators</a:t>
                       </a:r>
                       <a:r>
-                        <a:rPr lang="pt-BR" sz="1400" dirty="0"/>
+                        <a:rPr lang="pt-BR" sz="1000" dirty="0"/>
                         <a:t>, </a:t>
                       </a:r>
                       <a:r>
-                        <a:rPr lang="pt-BR" sz="1400" dirty="0" err="1"/>
+                        <a:rPr lang="pt-BR" sz="1000" dirty="0" err="1"/>
                         <a:t>max_depth</a:t>
                       </a:r>
                       <a:r>
-                        <a:rPr lang="pt-BR" sz="1400" dirty="0"/>
+                        <a:rPr lang="pt-BR" sz="1000" dirty="0"/>
                         <a:t>, </a:t>
                       </a:r>
                       <a:r>
-                        <a:rPr lang="pt-BR" sz="1400" dirty="0" err="1"/>
+                        <a:rPr lang="pt-BR" sz="1000" dirty="0" err="1"/>
                         <a:t>leaf_size</a:t>
                       </a:r>
-                      <a:endParaRPr lang="en-US" sz="1400" dirty="0"/>
+                      <a:endParaRPr lang="en-US" sz="1000" dirty="0"/>
                     </a:p>
                   </a:txBody>
                   <a:tcPr/>
@@ -4751,30 +4922,30 @@
                     <a:lstStyle/>
                     <a:p>
                       <a:r>
-                        <a:rPr lang="pt-BR" sz="1400" dirty="0" err="1"/>
+                        <a:rPr lang="pt-BR" sz="1000" dirty="0" err="1"/>
                         <a:t>Mean</a:t>
                       </a:r>
                       <a:r>
-                        <a:rPr lang="pt-BR" sz="1400" dirty="0"/>
+                        <a:rPr lang="pt-BR" sz="1000" dirty="0"/>
                         <a:t> </a:t>
                       </a:r>
                       <a:r>
-                        <a:rPr lang="pt-BR" sz="1400" dirty="0" err="1"/>
+                        <a:rPr lang="pt-BR" sz="1000" dirty="0" err="1"/>
                         <a:t>Absolute</a:t>
                       </a:r>
                       <a:r>
-                        <a:rPr lang="pt-BR" sz="1400" dirty="0"/>
+                        <a:rPr lang="pt-BR" sz="1000" dirty="0"/>
                         <a:t> </a:t>
                       </a:r>
                       <a:r>
-                        <a:rPr lang="pt-BR" sz="1400" dirty="0" err="1"/>
+                        <a:rPr lang="pt-BR" sz="1000" dirty="0" err="1"/>
                         <a:t>Error</a:t>
                       </a:r>
                       <a:r>
-                        <a:rPr lang="pt-BR" sz="1400" dirty="0"/>
+                        <a:rPr lang="pt-BR" sz="1000" dirty="0"/>
                         <a:t>/R2Score (VAL)</a:t>
                       </a:r>
-                      <a:endParaRPr lang="en-US" sz="1400" dirty="0"/>
+                      <a:endParaRPr lang="en-US" sz="1000" dirty="0"/>
                     </a:p>
                   </a:txBody>
                   <a:tcPr/>
@@ -4785,30 +4956,30 @@
                     <a:lstStyle/>
                     <a:p>
                       <a:r>
-                        <a:rPr lang="pt-BR" sz="1400" dirty="0" err="1"/>
+                        <a:rPr lang="pt-BR" sz="1000" dirty="0" err="1"/>
                         <a:t>Mean</a:t>
                       </a:r>
                       <a:r>
-                        <a:rPr lang="pt-BR" sz="1400" dirty="0"/>
+                        <a:rPr lang="pt-BR" sz="1000" dirty="0"/>
                         <a:t> </a:t>
                       </a:r>
                       <a:r>
-                        <a:rPr lang="pt-BR" sz="1400" dirty="0" err="1"/>
+                        <a:rPr lang="pt-BR" sz="1000" dirty="0" err="1"/>
                         <a:t>Absolute</a:t>
                       </a:r>
                       <a:r>
-                        <a:rPr lang="pt-BR" sz="1400" dirty="0"/>
+                        <a:rPr lang="pt-BR" sz="1000" dirty="0"/>
                         <a:t> </a:t>
                       </a:r>
                       <a:r>
-                        <a:rPr lang="pt-BR" sz="1400" dirty="0" err="1"/>
+                        <a:rPr lang="pt-BR" sz="1000" dirty="0" err="1"/>
                         <a:t>Error</a:t>
                       </a:r>
                       <a:r>
-                        <a:rPr lang="pt-BR" sz="1400" dirty="0"/>
+                        <a:rPr lang="pt-BR" sz="1000" dirty="0"/>
                         <a:t>/R2Score (Test)</a:t>
                       </a:r>
-                      <a:endParaRPr lang="en-US" sz="1400" dirty="0"/>
+                      <a:endParaRPr lang="en-US" sz="1000" dirty="0"/>
                     </a:p>
                   </a:txBody>
                   <a:tcPr/>
@@ -4819,17 +4990,17 @@
                   </a:ext>
                 </a:extLst>
               </a:tr>
-              <a:tr h="691900">
+              <a:tr h="698072">
                 <a:tc>
                   <a:txBody>
                     <a:bodyPr/>
                     <a:lstStyle/>
                     <a:p>
                       <a:r>
-                        <a:rPr lang="pt-BR" sz="1400" dirty="0"/>
+                        <a:rPr lang="pt-BR" sz="1000" dirty="0"/>
                         <a:t>329x329, 2x2, 24x24, 8</a:t>
                       </a:r>
-                      <a:endParaRPr lang="en-US" sz="1400" dirty="0"/>
+                      <a:endParaRPr lang="en-US" sz="1000" dirty="0"/>
                     </a:p>
                   </a:txBody>
                   <a:tcPr/>
@@ -4840,10 +5011,10 @@
                     <a:lstStyle/>
                     <a:p>
                       <a:r>
-                        <a:rPr lang="pt-BR" sz="1400" dirty="0"/>
+                        <a:rPr lang="pt-BR" sz="1000" dirty="0"/>
                         <a:t>4608</a:t>
                       </a:r>
-                      <a:endParaRPr lang="en-US" sz="1400" dirty="0"/>
+                      <a:endParaRPr lang="en-US" sz="1000" dirty="0"/>
                     </a:p>
                   </a:txBody>
                   <a:tcPr/>
@@ -4853,7 +5024,7 @@
                     <a:bodyPr/>
                     <a:lstStyle/>
                     <a:p>
-                      <a:endParaRPr lang="en-US" sz="1400" dirty="0"/>
+                      <a:endParaRPr lang="en-US" sz="1000" dirty="0"/>
                     </a:p>
                   </a:txBody>
                   <a:tcPr/>
@@ -4881,10 +5052,10 @@
                         <a:defRPr/>
                       </a:pPr>
                       <a:r>
-                        <a:rPr lang="pt-BR" sz="1400" dirty="0"/>
+                        <a:rPr lang="pt-BR" sz="1000" dirty="0"/>
                         <a:t>1.895/0.153</a:t>
                       </a:r>
-                      <a:endParaRPr lang="en-US" sz="1400" dirty="0"/>
+                      <a:endParaRPr lang="en-US" sz="1000" dirty="0"/>
                     </a:p>
                   </a:txBody>
                   <a:tcPr/>
@@ -4894,7 +5065,7 @@
                     <a:bodyPr/>
                     <a:lstStyle/>
                     <a:p>
-                      <a:endParaRPr lang="en-US" sz="1400" dirty="0"/>
+                      <a:endParaRPr lang="en-US" sz="1000" dirty="0"/>
                     </a:p>
                   </a:txBody>
                   <a:tcPr/>
@@ -4905,13 +5076,13 @@
                   </a:ext>
                 </a:extLst>
               </a:tr>
-              <a:tr h="691900">
+              <a:tr h="698072">
                 <a:tc>
                   <a:txBody>
                     <a:bodyPr/>
                     <a:lstStyle/>
                     <a:p>
-                      <a:endParaRPr lang="en-US" sz="1400" dirty="0"/>
+                      <a:endParaRPr lang="en-US" sz="1000" dirty="0"/>
                     </a:p>
                   </a:txBody>
                   <a:tcPr/>
@@ -4921,7 +5092,7 @@
                     <a:bodyPr/>
                     <a:lstStyle/>
                     <a:p>
-                      <a:endParaRPr lang="en-US" sz="1400" dirty="0"/>
+                      <a:endParaRPr lang="en-US" sz="1000" dirty="0"/>
                     </a:p>
                   </a:txBody>
                   <a:tcPr/>
@@ -4931,7 +5102,7 @@
                     <a:bodyPr/>
                     <a:lstStyle/>
                     <a:p>
-                      <a:endParaRPr lang="en-US" sz="1400" dirty="0"/>
+                      <a:endParaRPr lang="en-US" sz="1000" dirty="0"/>
                     </a:p>
                   </a:txBody>
                   <a:tcPr/>
@@ -4959,10 +5130,10 @@
                         <a:defRPr/>
                       </a:pPr>
                       <a:r>
-                        <a:rPr lang="pt-BR" sz="1400" dirty="0"/>
+                        <a:rPr lang="pt-BR" sz="1000" dirty="0"/>
                         <a:t>1.038/0.776</a:t>
                       </a:r>
-                      <a:endParaRPr lang="en-US" sz="1400" dirty="0"/>
+                      <a:endParaRPr lang="en-US" sz="1000" dirty="0"/>
                     </a:p>
                   </a:txBody>
                   <a:tcPr/>
@@ -4972,7 +5143,7 @@
                     <a:bodyPr/>
                     <a:lstStyle/>
                     <a:p>
-                      <a:endParaRPr lang="en-US" sz="1400" dirty="0"/>
+                      <a:endParaRPr lang="en-US" sz="1000" dirty="0"/>
                     </a:p>
                   </a:txBody>
                   <a:tcPr/>
@@ -4989,10 +5160,10 @@
       </p:graphicFrame>
       <p:pic>
         <p:nvPicPr>
-          <p:cNvPr id="4" name="Imagem 3">
-            <a:extLst>
-              <a:ext uri="{FF2B5EF4-FFF2-40B4-BE49-F238E27FC236}">
-                <a16:creationId xmlns:a16="http://schemas.microsoft.com/office/drawing/2014/main" id="{BC77C578-B69D-4774-9382-CFFE762D5DCE}"/>
+          <p:cNvPr id="7" name="Imagem 6">
+            <a:extLst>
+              <a:ext uri="{FF2B5EF4-FFF2-40B4-BE49-F238E27FC236}">
+                <a16:creationId xmlns:a16="http://schemas.microsoft.com/office/drawing/2014/main" id="{AC62479B-E2A9-48F1-899F-4A10C1F10A89}"/>
               </a:ext>
             </a:extLst>
           </p:cNvPr>
@@ -5009,8 +5180,38 @@
         </p:blipFill>
         <p:spPr>
           <a:xfrm>
-            <a:off x="7991937" y="360687"/>
-            <a:ext cx="3816772" cy="2920999"/>
+            <a:off x="133166" y="3976028"/>
+            <a:ext cx="2820200" cy="2096298"/>
+          </a:xfrm>
+          <a:prstGeom prst="rect">
+            <a:avLst/>
+          </a:prstGeom>
+        </p:spPr>
+      </p:pic>
+      <p:pic>
+        <p:nvPicPr>
+          <p:cNvPr id="8" name="Imagem 7">
+            <a:extLst>
+              <a:ext uri="{FF2B5EF4-FFF2-40B4-BE49-F238E27FC236}">
+                <a16:creationId xmlns:a16="http://schemas.microsoft.com/office/drawing/2014/main" id="{4BFDE481-52B5-4DBE-BEDB-B2F798CCFE04}"/>
+              </a:ext>
+            </a:extLst>
+          </p:cNvPr>
+          <p:cNvPicPr>
+            <a:picLocks noChangeAspect="1"/>
+          </p:cNvPicPr>
+          <p:nvPr/>
+        </p:nvPicPr>
+        <p:blipFill>
+          <a:blip r:embed="rId4"/>
+          <a:stretch>
+            <a:fillRect/>
+          </a:stretch>
+        </p:blipFill>
+        <p:spPr>
+          <a:xfrm>
+            <a:off x="4572000" y="299021"/>
+            <a:ext cx="6832800" cy="3569984"/>
           </a:xfrm>
           <a:prstGeom prst="rect">
             <a:avLst/>

</xml_diff>